<commit_message>
actualizació  de la pres
</commit_message>
<xml_diff>
--- a/A. No Supervisado Expectation-Maximization.pptx
+++ b/A. No Supervisado Expectation-Maximization.pptx
@@ -6073,62 +6073,6 @@
       </p:grpSpPr>
       <p:sp>
         <p:nvSpPr>
-          <p:cNvPr id="9" name="Rectángulo 8">
-            <a:extLst>
-              <a:ext uri="{FF2B5EF4-FFF2-40B4-BE49-F238E27FC236}">
-                <a16:creationId xmlns:a16="http://schemas.microsoft.com/office/drawing/2014/main" id="{9B02BDE8-9A1C-0B81-17B3-E6D52DBF84F6}"/>
-              </a:ext>
-            </a:extLst>
-          </p:cNvPr>
-          <p:cNvSpPr/>
-          <p:nvPr/>
-        </p:nvSpPr>
-        <p:spPr>
-          <a:xfrm>
-            <a:off x="6466611" y="0"/>
-            <a:ext cx="5725389" cy="6858000"/>
-          </a:xfrm>
-          <a:prstGeom prst="rect">
-            <a:avLst/>
-          </a:prstGeom>
-          <a:solidFill>
-            <a:srgbClr val="515AA3"/>
-          </a:solidFill>
-          <a:ln>
-            <a:noFill/>
-          </a:ln>
-        </p:spPr>
-        <p:style>
-          <a:lnRef idx="2">
-            <a:schemeClr val="accent1">
-              <a:shade val="15000"/>
-            </a:schemeClr>
-          </a:lnRef>
-          <a:fillRef idx="1">
-            <a:schemeClr val="accent1"/>
-          </a:fillRef>
-          <a:effectRef idx="0">
-            <a:schemeClr val="accent1"/>
-          </a:effectRef>
-          <a:fontRef idx="minor">
-            <a:schemeClr val="lt1"/>
-          </a:fontRef>
-        </p:style>
-        <p:txBody>
-          <a:bodyPr rtlCol="0" anchor="ctr"/>
-          <a:lstStyle/>
-          <a:p>
-            <a:pPr algn="ctr"/>
-            <a:endParaRPr lang="es-MX" dirty="0">
-              <a:highlight>
-                <a:srgbClr val="2633B0"/>
-              </a:highlight>
-            </a:endParaRPr>
-          </a:p>
-        </p:txBody>
-      </p:sp>
-      <p:sp>
-        <p:nvSpPr>
           <p:cNvPr id="7" name="CuadroTexto 6">
             <a:extLst>
               <a:ext uri="{FF2B5EF4-FFF2-40B4-BE49-F238E27FC236}">
@@ -6159,7 +6103,7 @@
               <a:rPr lang="es-MX" sz="2400" dirty="0">
                 <a:latin typeface="+mj-lt"/>
               </a:rPr>
-              <a:t>¿En qué consiste? </a:t>
+              <a:t>Procesamiento de imagenes</a:t>
             </a:r>
           </a:p>
         </p:txBody>
@@ -6178,8 +6122,8 @@
         </p:nvSpPr>
         <p:spPr>
           <a:xfrm>
-            <a:off x="552449" y="2588614"/>
-            <a:ext cx="5122720" cy="1477328"/>
+            <a:off x="602670" y="1933986"/>
+            <a:ext cx="10183093" cy="3416320"/>
           </a:xfrm>
           <a:prstGeom prst="rect">
             <a:avLst/>
@@ -6193,8 +6137,15 @@
           <a:lstStyle/>
           <a:p>
             <a:r>
+              <a:rPr lang="es-MX" b="1" dirty="0"/>
+              <a:t>Segmentación de imágenes</a:t>
+            </a:r>
+            <a:endParaRPr lang="es-MX" dirty="0"/>
+          </a:p>
+          <a:p>
+            <a:r>
               <a:rPr lang="es-MX" dirty="0"/>
-              <a:t>-Manejo de datos incompletos.</a:t>
+              <a:t>Dividir una imagen en regiones con características similares (por ejemplo, separar un objeto del fondo).</a:t>
             </a:r>
           </a:p>
           <a:p>
@@ -6202,8 +6153,18 @@
           </a:p>
           <a:p>
             <a:r>
+              <a:rPr lang="es-MX" b="1" dirty="0"/>
+              <a:t>Restauración de imágenes</a:t>
+            </a:r>
+            <a:r>
               <a:rPr lang="es-MX" dirty="0"/>
-              <a:t>-Flexibilidad a distintos modelos.</a:t>
+              <a:t> </a:t>
+            </a:r>
+          </a:p>
+          <a:p>
+            <a:r>
+              <a:rPr lang="es-MX" dirty="0"/>
+              <a:t>Eliminar ruido o rellenar partes faltantes de una imagen.</a:t>
             </a:r>
           </a:p>
           <a:p>
@@ -6211,8 +6172,31 @@
           </a:p>
           <a:p>
             <a:r>
+              <a:rPr lang="es-MX" b="1" dirty="0"/>
+              <a:t>Clasificación de imágenes</a:t>
+            </a:r>
+            <a:endParaRPr lang="es-MX" dirty="0"/>
+          </a:p>
+          <a:p>
+            <a:r>
               <a:rPr lang="es-MX" dirty="0"/>
-              <a:t>-Convergencia.</a:t>
+              <a:t>Asignar etiquetas a imágenes basándose en sus características.</a:t>
+            </a:r>
+          </a:p>
+          <a:p>
+            <a:endParaRPr lang="es-MX" dirty="0"/>
+          </a:p>
+          <a:p>
+            <a:r>
+              <a:rPr lang="es-MX" b="1" dirty="0"/>
+              <a:t>Detección de objetos</a:t>
+            </a:r>
+            <a:endParaRPr lang="es-MX" dirty="0"/>
+          </a:p>
+          <a:p>
+            <a:r>
+              <a:rPr lang="es-MX" dirty="0"/>
+              <a:t> Identificar y localizar objetos en una imagen.</a:t>
             </a:r>
           </a:p>
         </p:txBody>
@@ -6294,7 +6278,13 @@
         </p:nvPicPr>
         <p:blipFill>
           <a:blip r:embed="rId3">
-            <a:lum bright="70000" contrast="-70000"/>
+            <a:duotone>
+              <a:schemeClr val="accent5">
+                <a:shade val="45000"/>
+                <a:satMod val="135000"/>
+              </a:schemeClr>
+              <a:prstClr val="white"/>
+            </a:duotone>
             <a:extLst>
               <a:ext uri="{28A0092B-C50C-407E-A947-70E740481C1C}">
                 <a14:useLocalDpi xmlns:a14="http://schemas.microsoft.com/office/drawing/2010/main" val="0"/>
@@ -6326,240 +6316,6 @@
           </a:extLst>
         </p:spPr>
       </p:pic>
-      <p:sp>
-        <p:nvSpPr>
-          <p:cNvPr id="2" name="CuadroTexto 1">
-            <a:extLst>
-              <a:ext uri="{FF2B5EF4-FFF2-40B4-BE49-F238E27FC236}">
-                <a16:creationId xmlns:a16="http://schemas.microsoft.com/office/drawing/2014/main" id="{FF4B7AA3-E5C5-9A4A-2F68-223D49B300F7}"/>
-              </a:ext>
-            </a:extLst>
-          </p:cNvPr>
-          <p:cNvSpPr txBox="1"/>
-          <p:nvPr/>
-        </p:nvSpPr>
-        <p:spPr>
-          <a:xfrm>
-            <a:off x="289211" y="2085110"/>
-            <a:ext cx="1326575" cy="338554"/>
-          </a:xfrm>
-          <a:prstGeom prst="rect">
-            <a:avLst/>
-          </a:prstGeom>
-          <a:noFill/>
-        </p:spPr>
-        <p:txBody>
-          <a:bodyPr wrap="square" rtlCol="0" anchor="b">
-            <a:spAutoFit/>
-          </a:bodyPr>
-          <a:lstStyle/>
-          <a:p>
-            <a:pPr algn="ctr"/>
-            <a:r>
-              <a:rPr lang="es-MX" sz="1600" b="1" dirty="0">
-                <a:solidFill>
-                  <a:schemeClr val="bg1">
-                    <a:lumMod val="95000"/>
-                  </a:schemeClr>
-                </a:solidFill>
-                <a:highlight>
-                  <a:srgbClr val="AACD6D"/>
-                </a:highlight>
-                <a:latin typeface="Aptos Display" panose="020B0004020202020204" pitchFamily="34" charset="0"/>
-                <a:ea typeface="Apple Symbols" panose="02000000000000000000" pitchFamily="2" charset="-79"/>
-                <a:cs typeface="Al Nile" pitchFamily="2" charset="-78"/>
-              </a:rPr>
-              <a:t>Ventajas</a:t>
-            </a:r>
-            <a:endParaRPr lang="es-MX" b="1" dirty="0">
-              <a:solidFill>
-                <a:schemeClr val="bg1">
-                  <a:lumMod val="95000"/>
-                </a:schemeClr>
-              </a:solidFill>
-              <a:highlight>
-                <a:srgbClr val="AACD6D"/>
-              </a:highlight>
-              <a:latin typeface="Aptos Display" panose="020B0004020202020204" pitchFamily="34" charset="0"/>
-              <a:ea typeface="Apple Symbols" panose="02000000000000000000" pitchFamily="2" charset="-79"/>
-              <a:cs typeface="Al Nile" pitchFamily="2" charset="-78"/>
-            </a:endParaRPr>
-          </a:p>
-        </p:txBody>
-      </p:sp>
-      <p:sp>
-        <p:nvSpPr>
-          <p:cNvPr id="3" name="CuadroTexto 2">
-            <a:extLst>
-              <a:ext uri="{FF2B5EF4-FFF2-40B4-BE49-F238E27FC236}">
-                <a16:creationId xmlns:a16="http://schemas.microsoft.com/office/drawing/2014/main" id="{C8D18433-4696-FA8B-CE22-01675191DC0E}"/>
-              </a:ext>
-            </a:extLst>
-          </p:cNvPr>
-          <p:cNvSpPr txBox="1"/>
-          <p:nvPr/>
-        </p:nvSpPr>
-        <p:spPr>
-          <a:xfrm>
-            <a:off x="6986152" y="2588614"/>
-            <a:ext cx="5122720" cy="1477328"/>
-          </a:xfrm>
-          <a:prstGeom prst="rect">
-            <a:avLst/>
-          </a:prstGeom>
-          <a:noFill/>
-        </p:spPr>
-        <p:txBody>
-          <a:bodyPr wrap="square" rtlCol="0">
-            <a:spAutoFit/>
-          </a:bodyPr>
-          <a:lstStyle/>
-          <a:p>
-            <a:r>
-              <a:rPr lang="es-MX" dirty="0">
-                <a:solidFill>
-                  <a:schemeClr val="bg1"/>
-                </a:solidFill>
-              </a:rPr>
-              <a:t>-Convergencia lenta.</a:t>
-            </a:r>
-          </a:p>
-          <a:p>
-            <a:endParaRPr lang="es-MX" dirty="0">
-              <a:solidFill>
-                <a:schemeClr val="bg1"/>
-              </a:solidFill>
-            </a:endParaRPr>
-          </a:p>
-          <a:p>
-            <a:r>
-              <a:rPr lang="es-MX" dirty="0">
-                <a:solidFill>
-                  <a:schemeClr val="bg1"/>
-                </a:solidFill>
-              </a:rPr>
-              <a:t>-Dependencia del punto incial.</a:t>
-            </a:r>
-          </a:p>
-          <a:p>
-            <a:endParaRPr lang="es-MX" dirty="0">
-              <a:solidFill>
-                <a:schemeClr val="bg1"/>
-              </a:solidFill>
-            </a:endParaRPr>
-          </a:p>
-          <a:p>
-            <a:r>
-              <a:rPr lang="es-MX" dirty="0">
-                <a:solidFill>
-                  <a:schemeClr val="bg1"/>
-                </a:solidFill>
-              </a:rPr>
-              <a:t>-Encuentra optimos locales.</a:t>
-            </a:r>
-          </a:p>
-        </p:txBody>
-      </p:sp>
-      <p:sp>
-        <p:nvSpPr>
-          <p:cNvPr id="6" name="CuadroTexto 5">
-            <a:extLst>
-              <a:ext uri="{FF2B5EF4-FFF2-40B4-BE49-F238E27FC236}">
-                <a16:creationId xmlns:a16="http://schemas.microsoft.com/office/drawing/2014/main" id="{0D82D626-A386-105C-303B-5715A641842A}"/>
-              </a:ext>
-            </a:extLst>
-          </p:cNvPr>
-          <p:cNvSpPr txBox="1"/>
-          <p:nvPr/>
-        </p:nvSpPr>
-        <p:spPr>
-          <a:xfrm>
-            <a:off x="6778334" y="2098083"/>
-            <a:ext cx="1326575" cy="338554"/>
-          </a:xfrm>
-          <a:prstGeom prst="rect">
-            <a:avLst/>
-          </a:prstGeom>
-          <a:noFill/>
-        </p:spPr>
-        <p:txBody>
-          <a:bodyPr wrap="square" rtlCol="0" anchor="b">
-            <a:spAutoFit/>
-          </a:bodyPr>
-          <a:lstStyle/>
-          <a:p>
-            <a:pPr algn="ctr"/>
-            <a:r>
-              <a:rPr lang="es-MX" sz="1600" b="1" dirty="0">
-                <a:solidFill>
-                  <a:schemeClr val="bg1">
-                    <a:lumMod val="95000"/>
-                  </a:schemeClr>
-                </a:solidFill>
-                <a:highlight>
-                  <a:srgbClr val="FFB3C2"/>
-                </a:highlight>
-                <a:latin typeface="Aptos Display" panose="020B0004020202020204" pitchFamily="34" charset="0"/>
-                <a:ea typeface="Apple Symbols" panose="02000000000000000000" pitchFamily="2" charset="-79"/>
-                <a:cs typeface="Al Nile" pitchFamily="2" charset="-78"/>
-              </a:rPr>
-              <a:t>Desventajas</a:t>
-            </a:r>
-            <a:endParaRPr lang="es-MX" b="1" dirty="0">
-              <a:solidFill>
-                <a:schemeClr val="bg1">
-                  <a:lumMod val="95000"/>
-                </a:schemeClr>
-              </a:solidFill>
-              <a:highlight>
-                <a:srgbClr val="FFB3C2"/>
-              </a:highlight>
-              <a:latin typeface="Aptos Display" panose="020B0004020202020204" pitchFamily="34" charset="0"/>
-              <a:ea typeface="Apple Symbols" panose="02000000000000000000" pitchFamily="2" charset="-79"/>
-              <a:cs typeface="Al Nile" pitchFamily="2" charset="-78"/>
-            </a:endParaRPr>
-          </a:p>
-        </p:txBody>
-      </p:sp>
-      <p:sp>
-        <p:nvSpPr>
-          <p:cNvPr id="12" name="CuadroTexto 11">
-            <a:extLst>
-              <a:ext uri="{FF2B5EF4-FFF2-40B4-BE49-F238E27FC236}">
-                <a16:creationId xmlns:a16="http://schemas.microsoft.com/office/drawing/2014/main" id="{F01C2835-F647-5D54-D408-D8AAD36ACF1B}"/>
-              </a:ext>
-            </a:extLst>
-          </p:cNvPr>
-          <p:cNvSpPr txBox="1"/>
-          <p:nvPr/>
-        </p:nvSpPr>
-        <p:spPr>
-          <a:xfrm>
-            <a:off x="402128" y="5853229"/>
-            <a:ext cx="10269335" cy="261610"/>
-          </a:xfrm>
-          <a:prstGeom prst="rect">
-            <a:avLst/>
-          </a:prstGeom>
-          <a:noFill/>
-        </p:spPr>
-        <p:txBody>
-          <a:bodyPr wrap="square" rtlCol="0">
-            <a:spAutoFit/>
-          </a:bodyPr>
-          <a:lstStyle/>
-          <a:p>
-            <a:r>
-              <a:rPr lang="es-MX" sz="1100" dirty="0">
-                <a:solidFill>
-                  <a:srgbClr val="FFB3C2"/>
-                </a:solidFill>
-              </a:rPr>
-              <a:t>McLachlan, G. J., &amp; Krishnan, T. (2008). The EM algorithm and extensions. John Wiley &amp; Sons.</a:t>
-            </a:r>
-          </a:p>
-        </p:txBody>
-      </p:sp>
     </p:spTree>
     <p:extLst>
       <p:ext uri="{BB962C8B-B14F-4D97-AF65-F5344CB8AC3E}">

</xml_diff>